<commit_message>
Modif nav + types
</commit_message>
<xml_diff>
--- a/ProjetBDM_Model/Diagramme_nav.pptx
+++ b/ProjetBDM_Model/Diagramme_nav.pptx
@@ -104,6 +104,11 @@
       </a:defRPr>
     </a:lvl9pPr>
   </p:defaultTextStyle>
+  <p:extLst>
+    <p:ext uri="{EFAFB233-063F-42B5-8137-9DF3F51BA10A}">
+      <p15:sldGuideLst xmlns:p15="http://schemas.microsoft.com/office/powerpoint/2012/main"/>
+    </p:ext>
+  </p:extLst>
 </p:presentation>
 </file>
 
@@ -212,7 +217,7 @@
             <a:fld id="{176FA891-F897-433A-941E-17CAE11ABBB2}" type="datetime1">
               <a:rPr lang="fr-FR"/>
               <a:pPr lvl="0"/>
-              <a:t>13/04/2017</a:t>
+              <a:t>23/04/2017</a:t>
             </a:fld>
             <a:endParaRPr lang="fr-FR"/>
           </a:p>
@@ -279,11 +284,11 @@
   <p:clrMapOvr>
     <a:masterClrMapping/>
   </p:clrMapOvr>
-  <mc:AlternateContent xmlns:mc="http://schemas.openxmlformats.org/markup-compatibility/2006">
-    <mc:Choice xmlns:p14="http://schemas.microsoft.com/office/powerpoint/2010/main" Requires="p14">
+  <mc:AlternateContent xmlns:mc="http://schemas.openxmlformats.org/markup-compatibility/2006" xmlns:p14="http://schemas.microsoft.com/office/powerpoint/2010/main">
+    <mc:Choice Requires="p14">
       <p:transition spd="slow" p14:dur="2000"/>
     </mc:Choice>
-    <mc:Fallback>
+    <mc:Fallback xmlns="">
       <p:transition spd="slow"/>
     </mc:Fallback>
   </mc:AlternateContent>
@@ -425,7 +430,7 @@
             <a:fld id="{0693D420-5B48-494D-B8EF-D4B91FE85097}" type="datetime1">
               <a:rPr lang="fr-FR"/>
               <a:pPr lvl="0"/>
-              <a:t>13/04/2017</a:t>
+              <a:t>23/04/2017</a:t>
             </a:fld>
             <a:endParaRPr lang="fr-FR"/>
           </a:p>
@@ -492,11 +497,11 @@
   <p:clrMapOvr>
     <a:masterClrMapping/>
   </p:clrMapOvr>
-  <mc:AlternateContent xmlns:mc="http://schemas.openxmlformats.org/markup-compatibility/2006">
-    <mc:Choice xmlns:p14="http://schemas.microsoft.com/office/powerpoint/2010/main" Requires="p14">
+  <mc:AlternateContent xmlns:mc="http://schemas.openxmlformats.org/markup-compatibility/2006" xmlns:p14="http://schemas.microsoft.com/office/powerpoint/2010/main">
+    <mc:Choice Requires="p14">
       <p:transition spd="slow" p14:dur="2000"/>
     </mc:Choice>
-    <mc:Fallback>
+    <mc:Fallback xmlns="">
       <p:transition spd="slow"/>
     </mc:Fallback>
   </mc:AlternateContent>
@@ -647,7 +652,7 @@
             <a:fld id="{F04BFC7A-9A9D-4E76-A84B-5888CAA7905B}" type="datetime1">
               <a:rPr lang="fr-FR"/>
               <a:pPr lvl="0"/>
-              <a:t>13/04/2017</a:t>
+              <a:t>23/04/2017</a:t>
             </a:fld>
             <a:endParaRPr lang="fr-FR"/>
           </a:p>
@@ -714,11 +719,11 @@
   <p:clrMapOvr>
     <a:masterClrMapping/>
   </p:clrMapOvr>
-  <mc:AlternateContent xmlns:mc="http://schemas.openxmlformats.org/markup-compatibility/2006">
-    <mc:Choice xmlns:p14="http://schemas.microsoft.com/office/powerpoint/2010/main" Requires="p14">
+  <mc:AlternateContent xmlns:mc="http://schemas.openxmlformats.org/markup-compatibility/2006" xmlns:p14="http://schemas.microsoft.com/office/powerpoint/2010/main">
+    <mc:Choice Requires="p14">
       <p:transition spd="slow" p14:dur="2000"/>
     </mc:Choice>
-    <mc:Fallback>
+    <mc:Fallback xmlns="">
       <p:transition spd="slow"/>
     </mc:Fallback>
   </mc:AlternateContent>
@@ -859,7 +864,7 @@
             <a:fld id="{B1A1A99C-DBF0-4B77-9B69-9284B66ED0A7}" type="datetime1">
               <a:rPr lang="fr-FR"/>
               <a:pPr lvl="0"/>
-              <a:t>13/04/2017</a:t>
+              <a:t>23/04/2017</a:t>
             </a:fld>
             <a:endParaRPr lang="fr-FR"/>
           </a:p>
@@ -926,11 +931,11 @@
   <p:clrMapOvr>
     <a:masterClrMapping/>
   </p:clrMapOvr>
-  <mc:AlternateContent xmlns:mc="http://schemas.openxmlformats.org/markup-compatibility/2006">
-    <mc:Choice xmlns:p14="http://schemas.microsoft.com/office/powerpoint/2010/main" Requires="p14">
+  <mc:AlternateContent xmlns:mc="http://schemas.openxmlformats.org/markup-compatibility/2006" xmlns:p14="http://schemas.microsoft.com/office/powerpoint/2010/main">
+    <mc:Choice Requires="p14">
       <p:transition spd="slow" p14:dur="2000"/>
     </mc:Choice>
-    <mc:Fallback>
+    <mc:Fallback xmlns="">
       <p:transition spd="slow"/>
     </mc:Fallback>
   </mc:AlternateContent>
@@ -1046,7 +1051,7 @@
             <a:fld id="{20EB90DE-39F1-4C08-A9A2-BE71E6976D13}" type="datetime1">
               <a:rPr lang="fr-FR"/>
               <a:pPr lvl="0"/>
-              <a:t>13/04/2017</a:t>
+              <a:t>23/04/2017</a:t>
             </a:fld>
             <a:endParaRPr lang="fr-FR"/>
           </a:p>
@@ -1113,11 +1118,11 @@
   <p:clrMapOvr>
     <a:masterClrMapping/>
   </p:clrMapOvr>
-  <mc:AlternateContent xmlns:mc="http://schemas.openxmlformats.org/markup-compatibility/2006">
-    <mc:Choice xmlns:p14="http://schemas.microsoft.com/office/powerpoint/2010/main" Requires="p14">
+  <mc:AlternateContent xmlns:mc="http://schemas.openxmlformats.org/markup-compatibility/2006" xmlns:p14="http://schemas.microsoft.com/office/powerpoint/2010/main">
+    <mc:Choice Requires="p14">
       <p:transition spd="slow" p14:dur="2000"/>
     </mc:Choice>
-    <mc:Fallback>
+    <mc:Fallback xmlns="">
       <p:transition spd="slow"/>
     </mc:Fallback>
   </mc:AlternateContent>
@@ -1335,7 +1340,7 @@
             <a:fld id="{55930782-B17B-410F-8948-11266F652AC8}" type="datetime1">
               <a:rPr lang="fr-FR"/>
               <a:pPr lvl="0"/>
-              <a:t>13/04/2017</a:t>
+              <a:t>23/04/2017</a:t>
             </a:fld>
             <a:endParaRPr lang="fr-FR"/>
           </a:p>
@@ -1402,11 +1407,11 @@
   <p:clrMapOvr>
     <a:masterClrMapping/>
   </p:clrMapOvr>
-  <mc:AlternateContent xmlns:mc="http://schemas.openxmlformats.org/markup-compatibility/2006">
-    <mc:Choice xmlns:p14="http://schemas.microsoft.com/office/powerpoint/2010/main" Requires="p14">
+  <mc:AlternateContent xmlns:mc="http://schemas.openxmlformats.org/markup-compatibility/2006" xmlns:p14="http://schemas.microsoft.com/office/powerpoint/2010/main">
+    <mc:Choice Requires="p14">
       <p:transition spd="slow" p14:dur="2000"/>
     </mc:Choice>
-    <mc:Fallback>
+    <mc:Fallback xmlns="">
       <p:transition spd="slow"/>
     </mc:Fallback>
   </mc:AlternateContent>
@@ -1695,7 +1700,7 @@
             <a:fld id="{4115FD12-1640-434C-B56A-51FE4C825019}" type="datetime1">
               <a:rPr lang="fr-FR"/>
               <a:pPr lvl="0"/>
-              <a:t>13/04/2017</a:t>
+              <a:t>23/04/2017</a:t>
             </a:fld>
             <a:endParaRPr lang="fr-FR"/>
           </a:p>
@@ -1762,11 +1767,11 @@
   <p:clrMapOvr>
     <a:masterClrMapping/>
   </p:clrMapOvr>
-  <mc:AlternateContent xmlns:mc="http://schemas.openxmlformats.org/markup-compatibility/2006">
-    <mc:Choice xmlns:p14="http://schemas.microsoft.com/office/powerpoint/2010/main" Requires="p14">
+  <mc:AlternateContent xmlns:mc="http://schemas.openxmlformats.org/markup-compatibility/2006" xmlns:p14="http://schemas.microsoft.com/office/powerpoint/2010/main">
+    <mc:Choice Requires="p14">
       <p:transition spd="slow" p14:dur="2000"/>
     </mc:Choice>
-    <mc:Fallback>
+    <mc:Fallback xmlns="">
       <p:transition spd="slow"/>
     </mc:Fallback>
   </mc:AlternateContent>
@@ -1840,7 +1845,7 @@
             <a:fld id="{5BEF5F67-F53C-416A-9A7F-3BEC4389EFF5}" type="datetime1">
               <a:rPr lang="fr-FR"/>
               <a:pPr lvl="0"/>
-              <a:t>13/04/2017</a:t>
+              <a:t>23/04/2017</a:t>
             </a:fld>
             <a:endParaRPr lang="fr-FR"/>
           </a:p>
@@ -1907,11 +1912,11 @@
   <p:clrMapOvr>
     <a:masterClrMapping/>
   </p:clrMapOvr>
-  <mc:AlternateContent xmlns:mc="http://schemas.openxmlformats.org/markup-compatibility/2006">
-    <mc:Choice xmlns:p14="http://schemas.microsoft.com/office/powerpoint/2010/main" Requires="p14">
+  <mc:AlternateContent xmlns:mc="http://schemas.openxmlformats.org/markup-compatibility/2006" xmlns:p14="http://schemas.microsoft.com/office/powerpoint/2010/main">
+    <mc:Choice Requires="p14">
       <p:transition spd="slow" p14:dur="2000"/>
     </mc:Choice>
-    <mc:Fallback>
+    <mc:Fallback xmlns="">
       <p:transition spd="slow"/>
     </mc:Fallback>
   </mc:AlternateContent>
@@ -1958,7 +1963,7 @@
             <a:fld id="{A27438AD-9B1D-4FAE-94D4-40E53458E1A4}" type="datetime1">
               <a:rPr lang="fr-FR"/>
               <a:pPr lvl="0"/>
-              <a:t>13/04/2017</a:t>
+              <a:t>23/04/2017</a:t>
             </a:fld>
             <a:endParaRPr lang="fr-FR"/>
           </a:p>
@@ -2025,11 +2030,11 @@
   <p:clrMapOvr>
     <a:masterClrMapping/>
   </p:clrMapOvr>
-  <mc:AlternateContent xmlns:mc="http://schemas.openxmlformats.org/markup-compatibility/2006">
-    <mc:Choice xmlns:p14="http://schemas.microsoft.com/office/powerpoint/2010/main" Requires="p14">
+  <mc:AlternateContent xmlns:mc="http://schemas.openxmlformats.org/markup-compatibility/2006" xmlns:p14="http://schemas.microsoft.com/office/powerpoint/2010/main">
+    <mc:Choice Requires="p14">
       <p:transition spd="slow" p14:dur="2000"/>
     </mc:Choice>
-    <mc:Fallback>
+    <mc:Fallback xmlns="">
       <p:transition spd="slow"/>
     </mc:Fallback>
   </mc:AlternateContent>
@@ -2213,7 +2218,7 @@
             <a:fld id="{D6AD8C18-F0BD-4F73-9815-280DA47C386E}" type="datetime1">
               <a:rPr lang="fr-FR"/>
               <a:pPr lvl="0"/>
-              <a:t>13/04/2017</a:t>
+              <a:t>23/04/2017</a:t>
             </a:fld>
             <a:endParaRPr lang="fr-FR"/>
           </a:p>
@@ -2280,11 +2285,11 @@
   <p:clrMapOvr>
     <a:masterClrMapping/>
   </p:clrMapOvr>
-  <mc:AlternateContent xmlns:mc="http://schemas.openxmlformats.org/markup-compatibility/2006">
-    <mc:Choice xmlns:p14="http://schemas.microsoft.com/office/powerpoint/2010/main" Requires="p14">
+  <mc:AlternateContent xmlns:mc="http://schemas.openxmlformats.org/markup-compatibility/2006" xmlns:p14="http://schemas.microsoft.com/office/powerpoint/2010/main">
+    <mc:Choice Requires="p14">
       <p:transition spd="slow" p14:dur="2000"/>
     </mc:Choice>
-    <mc:Fallback>
+    <mc:Fallback xmlns="">
       <p:transition spd="slow"/>
     </mc:Fallback>
   </mc:AlternateContent>
@@ -2426,7 +2431,7 @@
             <a:fld id="{9EA83F35-2992-41AD-8F48-F2D3C2004101}" type="datetime1">
               <a:rPr lang="fr-FR"/>
               <a:pPr lvl="0"/>
-              <a:t>13/04/2017</a:t>
+              <a:t>23/04/2017</a:t>
             </a:fld>
             <a:endParaRPr lang="fr-FR"/>
           </a:p>
@@ -2493,11 +2498,11 @@
   <p:clrMapOvr>
     <a:masterClrMapping/>
   </p:clrMapOvr>
-  <mc:AlternateContent xmlns:mc="http://schemas.openxmlformats.org/markup-compatibility/2006">
-    <mc:Choice xmlns:p14="http://schemas.microsoft.com/office/powerpoint/2010/main" Requires="p14">
+  <mc:AlternateContent xmlns:mc="http://schemas.openxmlformats.org/markup-compatibility/2006" xmlns:p14="http://schemas.microsoft.com/office/powerpoint/2010/main">
+    <mc:Choice Requires="p14">
       <p:transition spd="slow" p14:dur="2000"/>
     </mc:Choice>
-    <mc:Fallback>
+    <mc:Fallback xmlns="">
       <p:transition spd="slow"/>
     </mc:Fallback>
   </mc:AlternateContent>
@@ -2685,7 +2690,7 @@
             <a:fld id="{200E126A-F150-4D56-9C93-029D54B5EB17}" type="datetime1">
               <a:rPr lang="fr-FR"/>
               <a:pPr lvl="0"/>
-              <a:t>13/04/2017</a:t>
+              <a:t>23/04/2017</a:t>
             </a:fld>
             <a:endParaRPr lang="fr-FR"/>
           </a:p>
@@ -2820,11 +2825,11 @@
     <p:sldLayoutId id="2147483658" r:id="rId10"/>
     <p:sldLayoutId id="2147483659" r:id="rId11"/>
   </p:sldLayoutIdLst>
-  <mc:AlternateContent xmlns:mc="http://schemas.openxmlformats.org/markup-compatibility/2006">
-    <mc:Choice xmlns:p14="http://schemas.microsoft.com/office/powerpoint/2010/main" Requires="p14">
+  <mc:AlternateContent xmlns:mc="http://schemas.openxmlformats.org/markup-compatibility/2006" xmlns:p14="http://schemas.microsoft.com/office/powerpoint/2010/main">
+    <mc:Choice Requires="p14">
       <p:transition spd="slow" p14:dur="2000"/>
     </mc:Choice>
-    <mc:Fallback>
+    <mc:Fallback xmlns="">
       <p:transition spd="slow"/>
     </mc:Fallback>
   </mc:AlternateContent>
@@ -3381,15 +3386,32 @@
                 </a:defRPr>
               </a:pPr>
               <a:r>
-                <a:rPr lang="fr-FR" sz="1000" b="0" i="0" u="none" strike="noStrike" kern="1200" cap="none" spc="0" baseline="0">
+                <a:rPr lang="fr-FR" sz="1000" b="0" i="0" u="none" strike="noStrike" kern="1200" cap="none" spc="0" baseline="0" dirty="0">
                   <a:solidFill>
                     <a:srgbClr val="000000"/>
                   </a:solidFill>
                   <a:uFillTx/>
                   <a:latin typeface="Calibri"/>
                 </a:rPr>
-                <a:t>Media Video</a:t>
+                <a:t>Media </a:t>
               </a:r>
+              <a:r>
+                <a:rPr lang="fr-FR" sz="1000" b="0" i="0" u="none" strike="noStrike" kern="1200" cap="none" spc="0" baseline="0" dirty="0" err="1">
+                  <a:solidFill>
+                    <a:srgbClr val="000000"/>
+                  </a:solidFill>
+                  <a:uFillTx/>
+                  <a:latin typeface="Calibri"/>
+                </a:rPr>
+                <a:t>Video</a:t>
+              </a:r>
+              <a:endParaRPr lang="fr-FR" sz="1000" b="0" i="0" u="none" strike="noStrike" kern="1200" cap="none" spc="0" baseline="0" dirty="0">
+                <a:solidFill>
+                  <a:srgbClr val="000000"/>
+                </a:solidFill>
+                <a:uFillTx/>
+                <a:latin typeface="Calibri"/>
+              </a:endParaRPr>
             </a:p>
           </p:txBody>
         </p:sp>
@@ -4183,7 +4205,7 @@
         </p:nvGrpSpPr>
         <p:grpSpPr>
           <a:xfrm>
-            <a:off x="7765744" y="2870005"/>
+            <a:off x="8448568" y="2855227"/>
             <a:ext cx="1636586" cy="1320986"/>
             <a:chOff x="8689150" y="2959903"/>
             <a:chExt cx="1064736" cy="1059726"/>
@@ -5627,8 +5649,8 @@
         </p:nvCxnSpPr>
         <p:spPr>
           <a:xfrm rot="5400000" flipH="1" flipV="1">
-            <a:off x="9112743" y="1924129"/>
-            <a:ext cx="702305" cy="1189449"/>
+            <a:off x="9461544" y="2258152"/>
+            <a:ext cx="687527" cy="506625"/>
           </a:xfrm>
           <a:prstGeom prst="bentConnector3">
             <a:avLst>
@@ -6086,156 +6108,6 @@
       </p:sp>
       <p:cxnSp>
         <p:nvCxnSpPr>
-          <p:cNvPr id="306" name="Connecteur en angle 305"/>
-          <p:cNvCxnSpPr>
-            <a:endCxn id="44" idx="1"/>
-          </p:cNvCxnSpPr>
-          <p:nvPr/>
-        </p:nvCxnSpPr>
-        <p:spPr>
-          <a:xfrm>
-            <a:off x="5520389" y="1634874"/>
-            <a:ext cx="2245355" cy="1912625"/>
-          </a:xfrm>
-          <a:prstGeom prst="bentConnector3">
-            <a:avLst>
-              <a:gd name="adj1" fmla="val 50000"/>
-            </a:avLst>
-          </a:prstGeom>
-          <a:ln>
-            <a:solidFill>
-              <a:schemeClr val="tx1"/>
-            </a:solidFill>
-            <a:headEnd type="oval"/>
-            <a:tailEnd type="arrow"/>
-          </a:ln>
-        </p:spPr>
-        <p:style>
-          <a:lnRef idx="1">
-            <a:schemeClr val="accent1"/>
-          </a:lnRef>
-          <a:fillRef idx="0">
-            <a:schemeClr val="accent1"/>
-          </a:fillRef>
-          <a:effectRef idx="0">
-            <a:schemeClr val="accent1"/>
-          </a:effectRef>
-          <a:fontRef idx="minor">
-            <a:schemeClr val="tx1"/>
-          </a:fontRef>
-        </p:style>
-      </p:cxnSp>
-      <p:cxnSp>
-        <p:nvCxnSpPr>
-          <p:cNvPr id="308" name="Connecteur droit avec flèche 307"/>
-          <p:cNvCxnSpPr/>
-          <p:nvPr/>
-        </p:nvCxnSpPr>
-        <p:spPr>
-          <a:xfrm>
-            <a:off x="7470799" y="3547498"/>
-            <a:ext cx="201589" cy="0"/>
-          </a:xfrm>
-          <a:prstGeom prst="straightConnector1">
-            <a:avLst/>
-          </a:prstGeom>
-          <a:ln>
-            <a:solidFill>
-              <a:schemeClr val="tx1"/>
-            </a:solidFill>
-            <a:tailEnd type="arrow"/>
-          </a:ln>
-        </p:spPr>
-        <p:style>
-          <a:lnRef idx="1">
-            <a:schemeClr val="accent1"/>
-          </a:lnRef>
-          <a:fillRef idx="0">
-            <a:schemeClr val="accent1"/>
-          </a:fillRef>
-          <a:effectRef idx="0">
-            <a:schemeClr val="accent1"/>
-          </a:effectRef>
-          <a:fontRef idx="minor">
-            <a:schemeClr val="tx1"/>
-          </a:fontRef>
-        </p:style>
-      </p:cxnSp>
-      <p:cxnSp>
-        <p:nvCxnSpPr>
-          <p:cNvPr id="310" name="Connecteur en angle 309"/>
-          <p:cNvCxnSpPr/>
-          <p:nvPr/>
-        </p:nvCxnSpPr>
-        <p:spPr>
-          <a:xfrm rot="10800000">
-            <a:off x="5639985" y="1528228"/>
-            <a:ext cx="2314686" cy="1956712"/>
-          </a:xfrm>
-          <a:prstGeom prst="bentConnector3">
-            <a:avLst/>
-          </a:prstGeom>
-          <a:ln>
-            <a:solidFill>
-              <a:schemeClr val="tx1"/>
-            </a:solidFill>
-            <a:headEnd type="none"/>
-            <a:tailEnd type="arrow"/>
-          </a:ln>
-        </p:spPr>
-        <p:style>
-          <a:lnRef idx="1">
-            <a:schemeClr val="accent1"/>
-          </a:lnRef>
-          <a:fillRef idx="0">
-            <a:schemeClr val="accent1"/>
-          </a:fillRef>
-          <a:effectRef idx="0">
-            <a:schemeClr val="accent1"/>
-          </a:effectRef>
-          <a:fontRef idx="minor">
-            <a:schemeClr val="tx1"/>
-          </a:fontRef>
-        </p:style>
-      </p:cxnSp>
-      <p:cxnSp>
-        <p:nvCxnSpPr>
-          <p:cNvPr id="316" name="Connecteur droit avec flèche 315"/>
-          <p:cNvCxnSpPr/>
-          <p:nvPr/>
-        </p:nvCxnSpPr>
-        <p:spPr>
-          <a:xfrm flipH="1">
-            <a:off x="5715001" y="1528227"/>
-            <a:ext cx="157092" cy="0"/>
-          </a:xfrm>
-          <a:prstGeom prst="straightConnector1">
-            <a:avLst/>
-          </a:prstGeom>
-          <a:ln>
-            <a:solidFill>
-              <a:schemeClr val="tx1"/>
-            </a:solidFill>
-            <a:tailEnd type="arrow"/>
-          </a:ln>
-        </p:spPr>
-        <p:style>
-          <a:lnRef idx="1">
-            <a:schemeClr val="accent1"/>
-          </a:lnRef>
-          <a:fillRef idx="0">
-            <a:schemeClr val="accent1"/>
-          </a:fillRef>
-          <a:effectRef idx="0">
-            <a:schemeClr val="accent1"/>
-          </a:effectRef>
-          <a:fontRef idx="minor">
-            <a:schemeClr val="tx1"/>
-          </a:fontRef>
-        </p:style>
-      </p:cxnSp>
-      <p:cxnSp>
-        <p:nvCxnSpPr>
           <p:cNvPr id="319" name="Connecteur droit 318"/>
           <p:cNvCxnSpPr/>
           <p:nvPr/>
@@ -6665,7 +6537,7 @@
         </p:nvSpPr>
         <p:spPr>
           <a:xfrm>
-            <a:off x="8002984" y="3099578"/>
+            <a:off x="8635702" y="3077462"/>
             <a:ext cx="779246" cy="215444"/>
           </a:xfrm>
           <a:prstGeom prst="rect">
@@ -6717,16 +6589,298 @@
           </a:p>
         </p:txBody>
       </p:sp>
+      <p:grpSp>
+        <p:nvGrpSpPr>
+          <p:cNvPr id="107" name="Groupe 42"/>
+          <p:cNvGrpSpPr/>
+          <p:nvPr/>
+        </p:nvGrpSpPr>
+        <p:grpSpPr>
+          <a:xfrm>
+            <a:off x="6211760" y="1835451"/>
+            <a:ext cx="1447583" cy="1107682"/>
+            <a:chOff x="6305318" y="236171"/>
+            <a:chExt cx="3433663" cy="2315617"/>
+          </a:xfrm>
+        </p:grpSpPr>
+        <p:sp>
+          <p:nvSpPr>
+            <p:cNvPr id="108" name="Rectangle 30"/>
+            <p:cNvSpPr/>
+            <p:nvPr/>
+          </p:nvSpPr>
+          <p:spPr>
+            <a:xfrm>
+              <a:off x="6305318" y="236171"/>
+              <a:ext cx="3433663" cy="2309271"/>
+            </a:xfrm>
+            <a:prstGeom prst="rect">
+              <a:avLst/>
+            </a:prstGeom>
+            <a:noFill/>
+            <a:ln w="12701" cap="flat">
+              <a:solidFill>
+                <a:srgbClr val="41719C"/>
+              </a:solidFill>
+              <a:prstDash val="solid"/>
+              <a:miter/>
+            </a:ln>
+          </p:spPr>
+          <p:txBody>
+            <a:bodyPr vert="horz" wrap="square" lIns="91440" tIns="45720" rIns="91440" bIns="45720" anchor="ctr" anchorCtr="1" compatLnSpc="1">
+              <a:noAutofit/>
+            </a:bodyPr>
+            <a:lstStyle/>
+            <a:p>
+              <a:pPr marL="0" marR="0" lvl="0" indent="0" algn="ctr" defTabSz="914400" rtl="0" fontAlgn="auto" hangingPunct="1">
+                <a:lnSpc>
+                  <a:spcPct val="100000"/>
+                </a:lnSpc>
+                <a:spcBef>
+                  <a:spcPts val="0"/>
+                </a:spcBef>
+                <a:spcAft>
+                  <a:spcPts val="0"/>
+                </a:spcAft>
+                <a:buNone/>
+                <a:tabLst/>
+                <a:defRPr sz="1800" b="0" i="0" u="none" strike="noStrike" kern="0" cap="none" spc="0" baseline="0">
+                  <a:solidFill>
+                    <a:srgbClr val="000000"/>
+                  </a:solidFill>
+                  <a:uFillTx/>
+                </a:defRPr>
+              </a:pPr>
+              <a:endParaRPr lang="fr-FR" sz="1800" b="0" i="0" u="none" strike="noStrike" kern="1200" cap="none" spc="0" baseline="0">
+                <a:solidFill>
+                  <a:srgbClr val="FFFFFF"/>
+                </a:solidFill>
+                <a:uFillTx/>
+                <a:latin typeface="Calibri"/>
+              </a:endParaRPr>
+            </a:p>
+          </p:txBody>
+        </p:sp>
+        <p:cxnSp>
+          <p:nvCxnSpPr>
+            <p:cNvPr id="109" name="Connecteur droit 32"/>
+            <p:cNvCxnSpPr/>
+            <p:nvPr/>
+          </p:nvCxnSpPr>
+          <p:spPr>
+            <a:xfrm>
+              <a:off x="6305318" y="540163"/>
+              <a:ext cx="3433663" cy="0"/>
+            </a:xfrm>
+            <a:prstGeom prst="straightConnector1">
+              <a:avLst/>
+            </a:prstGeom>
+            <a:noFill/>
+            <a:ln w="6345" cap="flat">
+              <a:solidFill>
+                <a:srgbClr val="5B9BD5"/>
+              </a:solidFill>
+              <a:prstDash val="solid"/>
+              <a:miter/>
+            </a:ln>
+          </p:spPr>
+        </p:cxnSp>
+        <p:cxnSp>
+          <p:nvCxnSpPr>
+            <p:cNvPr id="110" name="Connecteur droit 35"/>
+            <p:cNvCxnSpPr/>
+            <p:nvPr/>
+          </p:nvCxnSpPr>
+          <p:spPr>
+            <a:xfrm flipH="1">
+              <a:off x="6657353" y="540163"/>
+              <a:ext cx="3310" cy="2011625"/>
+            </a:xfrm>
+            <a:prstGeom prst="straightConnector1">
+              <a:avLst/>
+            </a:prstGeom>
+            <a:noFill/>
+            <a:ln w="6345" cap="flat">
+              <a:solidFill>
+                <a:srgbClr val="5B9BD5"/>
+              </a:solidFill>
+              <a:prstDash val="solid"/>
+              <a:miter/>
+            </a:ln>
+          </p:spPr>
+        </p:cxnSp>
+        <p:cxnSp>
+          <p:nvCxnSpPr>
+            <p:cNvPr id="111" name="Connecteur droit 39"/>
+            <p:cNvCxnSpPr/>
+            <p:nvPr/>
+          </p:nvCxnSpPr>
+          <p:spPr>
+            <a:xfrm flipH="1">
+              <a:off x="9443420" y="540163"/>
+              <a:ext cx="3301" cy="2011625"/>
+            </a:xfrm>
+            <a:prstGeom prst="straightConnector1">
+              <a:avLst/>
+            </a:prstGeom>
+            <a:noFill/>
+            <a:ln w="6345" cap="flat">
+              <a:solidFill>
+                <a:srgbClr val="5B9BD5"/>
+              </a:solidFill>
+              <a:prstDash val="solid"/>
+              <a:miter/>
+            </a:ln>
+          </p:spPr>
+        </p:cxnSp>
+        <p:cxnSp>
+          <p:nvCxnSpPr>
+            <p:cNvPr id="112" name="Connecteur droit 41"/>
+            <p:cNvCxnSpPr/>
+            <p:nvPr/>
+          </p:nvCxnSpPr>
+          <p:spPr>
+            <a:xfrm>
+              <a:off x="6657353" y="1545976"/>
+              <a:ext cx="2786067" cy="0"/>
+            </a:xfrm>
+            <a:prstGeom prst="straightConnector1">
+              <a:avLst/>
+            </a:prstGeom>
+            <a:noFill/>
+            <a:ln w="6345" cap="flat">
+              <a:solidFill>
+                <a:srgbClr val="5B9BD5"/>
+              </a:solidFill>
+              <a:prstDash val="solid"/>
+              <a:miter/>
+            </a:ln>
+          </p:spPr>
+        </p:cxnSp>
+      </p:grpSp>
+      <p:cxnSp>
+        <p:nvCxnSpPr>
+          <p:cNvPr id="28" name="Connecteur en angle 27"/>
+          <p:cNvCxnSpPr>
+            <a:stCxn id="44" idx="1"/>
+          </p:cNvCxnSpPr>
+          <p:nvPr/>
+        </p:nvCxnSpPr>
+        <p:spPr>
+          <a:xfrm rot="10800000">
+            <a:off x="7527548" y="2743649"/>
+            <a:ext cx="921021" cy="789073"/>
+          </a:xfrm>
+          <a:prstGeom prst="bentConnector3">
+            <a:avLst>
+              <a:gd name="adj1" fmla="val 50000"/>
+            </a:avLst>
+          </a:prstGeom>
+          <a:ln>
+            <a:solidFill>
+              <a:schemeClr val="tx1"/>
+            </a:solidFill>
+            <a:headEnd type="arrow"/>
+            <a:tailEnd type="none"/>
+          </a:ln>
+        </p:spPr>
+        <p:style>
+          <a:lnRef idx="1">
+            <a:schemeClr val="accent1"/>
+          </a:lnRef>
+          <a:fillRef idx="0">
+            <a:schemeClr val="accent1"/>
+          </a:fillRef>
+          <a:effectRef idx="0">
+            <a:schemeClr val="accent1"/>
+          </a:effectRef>
+          <a:fontRef idx="minor">
+            <a:schemeClr val="tx1"/>
+          </a:fontRef>
+        </p:style>
+      </p:cxnSp>
+      <p:cxnSp>
+        <p:nvCxnSpPr>
+          <p:cNvPr id="58" name="Connecteur en angle 57"/>
+          <p:cNvCxnSpPr/>
+          <p:nvPr/>
+        </p:nvCxnSpPr>
+        <p:spPr>
+          <a:xfrm rot="10800000">
+            <a:off x="5641555" y="1649641"/>
+            <a:ext cx="718619" cy="575160"/>
+          </a:xfrm>
+          <a:prstGeom prst="bentConnector3">
+            <a:avLst/>
+          </a:prstGeom>
+          <a:ln>
+            <a:solidFill>
+              <a:schemeClr val="tx1"/>
+            </a:solidFill>
+            <a:tailEnd type="arrow"/>
+          </a:ln>
+        </p:spPr>
+        <p:style>
+          <a:lnRef idx="1">
+            <a:schemeClr val="accent1"/>
+          </a:lnRef>
+          <a:fillRef idx="0">
+            <a:schemeClr val="accent1"/>
+          </a:fillRef>
+          <a:effectRef idx="0">
+            <a:schemeClr val="accent1"/>
+          </a:effectRef>
+          <a:fontRef idx="minor">
+            <a:schemeClr val="tx1"/>
+          </a:fontRef>
+        </p:style>
+      </p:cxnSp>
+      <p:sp>
+        <p:nvSpPr>
+          <p:cNvPr id="87" name="ZoneTexte 86"/>
+          <p:cNvSpPr txBox="1"/>
+          <p:nvPr/>
+        </p:nvSpPr>
+        <p:spPr>
+          <a:xfrm>
+            <a:off x="6376665" y="1778237"/>
+            <a:ext cx="1107427" cy="246221"/>
+          </a:xfrm>
+          <a:prstGeom prst="rect">
+            <a:avLst/>
+          </a:prstGeom>
+          <a:noFill/>
+        </p:spPr>
+        <p:txBody>
+          <a:bodyPr wrap="square" rtlCol="0">
+            <a:spAutoFit/>
+          </a:bodyPr>
+          <a:lstStyle/>
+          <a:p>
+            <a:r>
+              <a:rPr lang="fr-FR" sz="1000" dirty="0" err="1" smtClean="0">
+                <a:latin typeface="Calibri" panose="020F0502020204030204" pitchFamily="34" charset="0"/>
+                <a:cs typeface="Calibri" panose="020F0502020204030204" pitchFamily="34" charset="0"/>
+              </a:rPr>
+              <a:t>MedVid_Acteur</a:t>
+            </a:r>
+            <a:endParaRPr lang="fr-FR" sz="1000" dirty="0">
+              <a:latin typeface="Calibri" panose="020F0502020204030204" pitchFamily="34" charset="0"/>
+              <a:cs typeface="Calibri" panose="020F0502020204030204" pitchFamily="34" charset="0"/>
+            </a:endParaRPr>
+          </a:p>
+        </p:txBody>
+      </p:sp>
     </p:spTree>
   </p:cSld>
   <p:clrMapOvr>
     <a:masterClrMapping/>
   </p:clrMapOvr>
-  <mc:AlternateContent xmlns:mc="http://schemas.openxmlformats.org/markup-compatibility/2006">
-    <mc:Choice xmlns:p14="http://schemas.microsoft.com/office/powerpoint/2010/main" Requires="p14">
+  <mc:AlternateContent xmlns:mc="http://schemas.openxmlformats.org/markup-compatibility/2006" xmlns:p14="http://schemas.microsoft.com/office/powerpoint/2010/main">
+    <mc:Choice Requires="p14">
       <p:transition spd="slow" p14:dur="2000"/>
     </mc:Choice>
-    <mc:Fallback>
+    <mc:Fallback xmlns="">
       <p:transition spd="slow"/>
     </mc:Fallback>
   </mc:AlternateContent>

</xml_diff>